<commit_message>
Stav corrections to simple_graphs
</commit_message>
<xml_diff>
--- a/restricted/slides5w.pptx
+++ b/restricted/slides5w.pptx
@@ -291,7 +291,7 @@
               <a:pPr>
                 <a:defRPr/>
               </a:pPr>
-              <a:t>2/28/10</a:t>
+              <a:t>3/1/10</a:t>
             </a:fld>
             <a:endParaRPr lang="en-US"/>
           </a:p>
@@ -489,7 +489,7 @@
               <a:pPr>
                 <a:defRPr/>
               </a:pPr>
-              <a:t>2/28/10</a:t>
+              <a:t>3/1/10</a:t>
             </a:fld>
             <a:endParaRPr lang="en-US"/>
           </a:p>
@@ -11308,12 +11308,12 @@
           <p:nvPr/>
         </p:nvGraphicFramePr>
         <p:xfrm>
-          <a:off x="152400" y="3971925"/>
-          <a:ext cx="8743950" cy="1085850"/>
+          <a:off x="409575" y="3971925"/>
+          <a:ext cx="8229600" cy="1085850"/>
         </p:xfrm>
         <a:graphic>
           <a:graphicData uri="http://schemas.openxmlformats.org/presentationml/2006/ole">
-            <p:oleObj spid="_x0000_s34818" name="Equation" r:id="rId4" imgW="1943100" imgH="241300" progId="Equation.DSMT4">
+            <p:oleObj spid="_x0000_s34818" name="Equation" r:id="rId4" imgW="1828800" imgH="241300" progId="Equation.DSMT4">
               <p:embed/>
             </p:oleObj>
           </a:graphicData>
@@ -25331,7 +25331,7 @@
       </p:par>
     </p:tnLst>
     <p:bldLst>
-      <p:bldP spid="41989" grpId="0" autoUpdateAnimBg="0"/>
+      <p:bldP spid="41989" grpId="0" animBg="1" autoUpdateAnimBg="0"/>
     </p:bldLst>
   </p:timing>
 </p:sld>

</xml_diff>